<commit_message>
Start of January 24th
</commit_message>
<xml_diff>
--- a/6020_Graph_2/D2D/W01/Week_01/6020_W24_W01D1_CourseIntro.pptx
+++ b/6020_Graph_2/D2D/W01/Week_01/6020_W24_W01D1_CourseIntro.pptx
@@ -229,7 +229,7 @@
             <a:fld id="{C796373C-ADE7-4794-A5C6-CF8090C1CBE1}" type="datetimeFigureOut">
               <a:rPr lang="en-CA" smtClean="0"/>
               <a:pPr/>
-              <a:t>2024-01-18</a:t>
+              <a:t>2024-01-23</a:t>
             </a:fld>
             <a:endParaRPr lang="en-CA"/>
           </a:p>
@@ -740,7 +740,7 @@
             <a:fld id="{1D8BD707-D9CF-40AE-B4C6-C98DA3205C09}" type="datetimeFigureOut">
               <a:rPr lang="en-US" smtClean="0"/>
               <a:pPr/>
-              <a:t>1/18/2024</a:t>
+              <a:t>1/23/2024</a:t>
             </a:fld>
             <a:endParaRPr lang="en-US"/>
           </a:p>
@@ -962,7 +962,7 @@
             <a:fld id="{1D8BD707-D9CF-40AE-B4C6-C98DA3205C09}" type="datetimeFigureOut">
               <a:rPr lang="en-US" smtClean="0"/>
               <a:pPr/>
-              <a:t>1/18/2024</a:t>
+              <a:t>1/23/2024</a:t>
             </a:fld>
             <a:endParaRPr lang="en-US"/>
           </a:p>
@@ -1235,7 +1235,7 @@
             <a:fld id="{1D8BD707-D9CF-40AE-B4C6-C98DA3205C09}" type="datetimeFigureOut">
               <a:rPr lang="en-US" smtClean="0"/>
               <a:pPr/>
-              <a:t>1/18/2024</a:t>
+              <a:t>1/23/2024</a:t>
             </a:fld>
             <a:endParaRPr lang="en-US"/>
           </a:p>
@@ -1411,7 +1411,7 @@
             <a:fld id="{409CD64F-A5A1-4F21-A75E-AF65C33CA0D3}" type="datetimeFigureOut">
               <a:rPr lang="en-CA" smtClean="0"/>
               <a:pPr/>
-              <a:t>2024-01-18</a:t>
+              <a:t>2024-01-23</a:t>
             </a:fld>
             <a:endParaRPr lang="en-CA"/>
           </a:p>
@@ -1766,7 +1766,7 @@
             <a:fld id="{1D8BD707-D9CF-40AE-B4C6-C98DA3205C09}" type="datetimeFigureOut">
               <a:rPr lang="en-US" smtClean="0"/>
               <a:pPr/>
-              <a:t>1/18/2024</a:t>
+              <a:t>1/23/2024</a:t>
             </a:fld>
             <a:endParaRPr lang="en-US"/>
           </a:p>
@@ -2052,7 +2052,7 @@
             <a:fld id="{1D8BD707-D9CF-40AE-B4C6-C98DA3205C09}" type="datetimeFigureOut">
               <a:rPr lang="en-US" smtClean="0"/>
               <a:pPr/>
-              <a:t>1/18/2024</a:t>
+              <a:t>1/23/2024</a:t>
             </a:fld>
             <a:endParaRPr lang="en-US"/>
           </a:p>
@@ -2475,7 +2475,7 @@
             <a:fld id="{1D8BD707-D9CF-40AE-B4C6-C98DA3205C09}" type="datetimeFigureOut">
               <a:rPr lang="en-US" smtClean="0"/>
               <a:pPr/>
-              <a:t>1/18/2024</a:t>
+              <a:t>1/23/2024</a:t>
             </a:fld>
             <a:endParaRPr lang="en-US"/>
           </a:p>
@@ -2589,7 +2589,7 @@
             <a:fld id="{1D8BD707-D9CF-40AE-B4C6-C98DA3205C09}" type="datetimeFigureOut">
               <a:rPr lang="en-US" smtClean="0"/>
               <a:pPr/>
-              <a:t>1/18/2024</a:t>
+              <a:t>1/23/2024</a:t>
             </a:fld>
             <a:endParaRPr lang="en-US"/>
           </a:p>
@@ -2681,7 +2681,7 @@
             <a:fld id="{1D8BD707-D9CF-40AE-B4C6-C98DA3205C09}" type="datetimeFigureOut">
               <a:rPr lang="en-US" smtClean="0"/>
               <a:pPr/>
-              <a:t>1/18/2024</a:t>
+              <a:t>1/23/2024</a:t>
             </a:fld>
             <a:endParaRPr lang="en-US"/>
           </a:p>
@@ -2960,7 +2960,7 @@
             <a:fld id="{1D8BD707-D9CF-40AE-B4C6-C98DA3205C09}" type="datetimeFigureOut">
               <a:rPr lang="en-US" smtClean="0"/>
               <a:pPr/>
-              <a:t>1/18/2024</a:t>
+              <a:t>1/23/2024</a:t>
             </a:fld>
             <a:endParaRPr lang="en-US"/>
           </a:p>
@@ -3323,7 +3323,7 @@
             <a:fld id="{1D8BD707-D9CF-40AE-B4C6-C98DA3205C09}" type="datetimeFigureOut">
               <a:rPr lang="en-US" smtClean="0"/>
               <a:pPr/>
-              <a:t>1/18/2024</a:t>
+              <a:t>1/23/2024</a:t>
             </a:fld>
             <a:endParaRPr lang="en-US"/>
           </a:p>
@@ -3748,7 +3748,7 @@
             <a:fld id="{1D8BD707-D9CF-40AE-B4C6-C98DA3205C09}" type="datetimeFigureOut">
               <a:rPr lang="en-US" smtClean="0"/>
               <a:pPr/>
-              <a:t>1/18/2024</a:t>
+              <a:t>1/23/2024</a:t>
             </a:fld>
             <a:endParaRPr lang="en-US"/>
           </a:p>
@@ -5177,14 +5177,14 @@
           <p:nvPr>
             <p:extLst>
               <p:ext uri="{D42A27DB-BD31-4B8C-83A1-F6EECF244321}">
-                <p14:modId xmlns:p14="http://schemas.microsoft.com/office/powerpoint/2010/main" val="2556164488"/>
+                <p14:modId xmlns:p14="http://schemas.microsoft.com/office/powerpoint/2010/main" val="1063355231"/>
               </p:ext>
             </p:extLst>
           </p:nvPr>
         </p:nvGraphicFramePr>
         <p:xfrm>
           <a:off x="152400" y="1276350"/>
-          <a:ext cx="8686801" cy="3108015"/>
+          <a:ext cx="8686801" cy="3200403"/>
         </p:xfrm>
         <a:graphic>
           <a:graphicData uri="http://schemas.openxmlformats.org/drawingml/2006/table">
@@ -5206,7 +5206,7 @@
                   </a:extLst>
                 </a:gridCol>
               </a:tblGrid>
-              <a:tr h="199580">
+              <a:tr h="205512">
                 <a:tc>
                   <a:txBody>
                     <a:bodyPr/>
@@ -5377,7 +5377,7 @@
                   </a:ext>
                 </a:extLst>
               </a:tr>
-              <a:tr h="154497">
+              <a:tr h="186878">
                 <a:tc>
                   <a:txBody>
                     <a:bodyPr/>
@@ -5532,7 +5532,7 @@
                   </a:ext>
                 </a:extLst>
               </a:tr>
-              <a:tr h="217234">
+              <a:tr h="223691">
                 <a:tc>
                   <a:txBody>
                     <a:bodyPr/>
@@ -5678,7 +5678,7 @@
                   </a:ext>
                 </a:extLst>
               </a:tr>
-              <a:tr h="203524">
+              <a:tr h="209574">
                 <a:tc>
                   <a:txBody>
                     <a:bodyPr/>
@@ -5840,7 +5840,7 @@
                   </a:ext>
                 </a:extLst>
               </a:tr>
-              <a:tr h="217724">
+              <a:tr h="224196">
                 <a:tc>
                   <a:txBody>
                     <a:bodyPr/>
@@ -6011,7 +6011,7 @@
                   </a:ext>
                 </a:extLst>
               </a:tr>
-              <a:tr h="217724">
+              <a:tr h="224196">
                 <a:tc>
                   <a:txBody>
                     <a:bodyPr/>
@@ -6166,7 +6166,7 @@
                   </a:ext>
                 </a:extLst>
               </a:tr>
-              <a:tr h="196773">
+              <a:tr h="202622">
                 <a:tc>
                   <a:txBody>
                     <a:bodyPr/>
@@ -6326,7 +6326,7 @@
                   </a:ext>
                 </a:extLst>
               </a:tr>
-              <a:tr h="153117">
+              <a:tr h="186878">
                 <a:tc>
                   <a:txBody>
                     <a:bodyPr/>
@@ -6481,7 +6481,7 @@
                   </a:ext>
                 </a:extLst>
               </a:tr>
-              <a:tr h="145950">
+              <a:tr h="385394">
                 <a:tc>
                   <a:txBody>
                     <a:bodyPr/>
@@ -6663,7 +6663,7 @@
                   </a:ext>
                 </a:extLst>
               </a:tr>
-              <a:tr h="205248">
+              <a:tr h="211349">
                 <a:tc>
                   <a:txBody>
                     <a:bodyPr/>
@@ -6831,7 +6831,7 @@
                   </a:ext>
                 </a:extLst>
               </a:tr>
-              <a:tr h="139924">
+              <a:tr h="186878">
                 <a:tc>
                   <a:txBody>
                     <a:bodyPr/>
@@ -6986,7 +6986,7 @@
                   </a:ext>
                 </a:extLst>
               </a:tr>
-              <a:tr h="187041">
+              <a:tr h="192601">
                 <a:tc>
                   <a:txBody>
                     <a:bodyPr/>
@@ -7132,7 +7132,7 @@
                   </a:ext>
                 </a:extLst>
               </a:tr>
-              <a:tr h="161676">
+              <a:tr h="186878">
                 <a:tc>
                   <a:txBody>
                     <a:bodyPr/>
@@ -7310,7 +7310,7 @@
                   </a:ext>
                 </a:extLst>
               </a:tr>
-              <a:tr h="132206">
+              <a:tr h="186878">
                 <a:tc>
                   <a:txBody>
                     <a:bodyPr/>
@@ -7501,7 +7501,7 @@
                   </a:ext>
                 </a:extLst>
               </a:tr>
-              <a:tr h="132206">
+              <a:tr h="186878">
                 <a:tc>
                   <a:txBody>
                     <a:bodyPr/>

</xml_diff>